<commit_message>
Fix links for github pages
</commit_message>
<xml_diff>
--- a/img/RT_logos.pptx
+++ b/img/RT_logos.pptx
@@ -5119,222 +5119,201 @@
           <a:chExt cx="0" cy="0"/>
         </a:xfrm>
       </p:grpSpPr>
-      <p:grpSp>
-        <p:nvGrpSpPr>
-          <p:cNvPr id="8" name="Group 7">
-            <a:extLst>
-              <a:ext uri="{FF2B5EF4-FFF2-40B4-BE49-F238E27FC236}">
-                <a16:creationId xmlns:a16="http://schemas.microsoft.com/office/drawing/2014/main" id="{6B9C3359-2D78-5EED-C930-6D511C543D54}"/>
-              </a:ext>
-            </a:extLst>
-          </p:cNvPr>
-          <p:cNvGrpSpPr/>
+      <p:sp>
+        <p:nvSpPr>
+          <p:cNvPr id="4" name="Rectangle 3">
+            <a:extLst>
+              <a:ext uri="{FF2B5EF4-FFF2-40B4-BE49-F238E27FC236}">
+                <a16:creationId xmlns:a16="http://schemas.microsoft.com/office/drawing/2014/main" id="{01F57C9C-A43B-F8A1-9281-FE97FF956B6C}"/>
+              </a:ext>
+            </a:extLst>
+          </p:cNvPr>
+          <p:cNvSpPr/>
           <p:nvPr/>
-        </p:nvGrpSpPr>
-        <p:grpSpPr>
+        </p:nvSpPr>
+        <p:spPr>
           <a:xfrm>
-            <a:off x="1477535" y="1336430"/>
-            <a:ext cx="5685692" cy="5967901"/>
-            <a:chOff x="914400" y="1336431"/>
-            <a:chExt cx="5685692" cy="5967901"/>
+            <a:off x="1" y="-1"/>
+            <a:ext cx="8640760" cy="1685068"/>
           </a:xfrm>
-        </p:grpSpPr>
-        <p:sp>
-          <p:nvSpPr>
-            <p:cNvPr id="4" name="Rectangle 3">
-              <a:extLst>
-                <a:ext uri="{FF2B5EF4-FFF2-40B4-BE49-F238E27FC236}">
-                  <a16:creationId xmlns:a16="http://schemas.microsoft.com/office/drawing/2014/main" id="{01F57C9C-A43B-F8A1-9281-FE97FF956B6C}"/>
-                </a:ext>
-              </a:extLst>
-            </p:cNvPr>
-            <p:cNvSpPr/>
-            <p:nvPr/>
-          </p:nvSpPr>
-          <p:spPr>
-            <a:xfrm>
-              <a:off x="914401" y="1336431"/>
-              <a:ext cx="5685690" cy="1163823"/>
-            </a:xfrm>
-            <a:prstGeom prst="rect">
-              <a:avLst/>
-            </a:prstGeom>
+          <a:prstGeom prst="rect">
+            <a:avLst/>
+          </a:prstGeom>
+          <a:solidFill>
+            <a:srgbClr val="F48325"/>
+          </a:solidFill>
+          <a:ln>
             <a:solidFill>
               <a:srgbClr val="F48325"/>
             </a:solidFill>
-            <a:ln>
-              <a:solidFill>
-                <a:srgbClr val="F48325"/>
-              </a:solidFill>
-            </a:ln>
-          </p:spPr>
-          <p:style>
-            <a:lnRef idx="2">
-              <a:schemeClr val="accent1">
-                <a:shade val="50000"/>
-              </a:schemeClr>
-            </a:lnRef>
-            <a:fillRef idx="1">
-              <a:schemeClr val="accent1"/>
-            </a:fillRef>
-            <a:effectRef idx="0">
-              <a:schemeClr val="accent1"/>
-            </a:effectRef>
-            <a:fontRef idx="minor">
-              <a:schemeClr val="lt1"/>
-            </a:fontRef>
-          </p:style>
-          <p:txBody>
-            <a:bodyPr rtlCol="0" anchor="ctr"/>
-            <a:lstStyle/>
-            <a:p>
-              <a:pPr algn="ctr"/>
-              <a:endParaRPr lang="en-US"/>
-            </a:p>
-          </p:txBody>
-        </p:sp>
-        <p:sp>
-          <p:nvSpPr>
-            <p:cNvPr id="5" name="TextBox 4">
-              <a:extLst>
-                <a:ext uri="{FF2B5EF4-FFF2-40B4-BE49-F238E27FC236}">
-                  <a16:creationId xmlns:a16="http://schemas.microsoft.com/office/drawing/2014/main" id="{BFE5DAC8-7A4C-24AD-4364-95B2DA5E66DE}"/>
-                </a:ext>
-              </a:extLst>
-            </p:cNvPr>
-            <p:cNvSpPr txBox="1"/>
-            <p:nvPr/>
-          </p:nvSpPr>
-          <p:spPr>
-            <a:xfrm>
-              <a:off x="914400" y="1627336"/>
-              <a:ext cx="5685691" cy="5386090"/>
-            </a:xfrm>
-            <a:prstGeom prst="rect">
-              <a:avLst/>
-            </a:prstGeom>
-            <a:noFill/>
-          </p:spPr>
-          <p:txBody>
-            <a:bodyPr wrap="square" rtlCol="0">
-              <a:spAutoFit/>
-            </a:bodyPr>
-            <a:lstStyle/>
-            <a:p>
-              <a:pPr algn="ctr"/>
-              <a:r>
-                <a:rPr lang="en-US" sz="34400" b="1" dirty="0">
-                  <a:latin typeface="Roboto" panose="02000000000000000000" pitchFamily="2" charset="0"/>
-                  <a:ea typeface="Roboto" panose="02000000000000000000" pitchFamily="2" charset="0"/>
-                </a:rPr>
-                <a:t>RT</a:t>
-              </a:r>
-            </a:p>
-          </p:txBody>
-        </p:sp>
-        <p:sp>
-          <p:nvSpPr>
-            <p:cNvPr id="6" name="Rectangle 5">
-              <a:extLst>
-                <a:ext uri="{FF2B5EF4-FFF2-40B4-BE49-F238E27FC236}">
-                  <a16:creationId xmlns:a16="http://schemas.microsoft.com/office/drawing/2014/main" id="{3893948A-E637-9104-30B9-5D7AF71F8386}"/>
-                </a:ext>
-              </a:extLst>
-            </p:cNvPr>
-            <p:cNvSpPr/>
-            <p:nvPr/>
-          </p:nvSpPr>
-          <p:spPr>
-            <a:xfrm>
-              <a:off x="914401" y="6140509"/>
-              <a:ext cx="5685690" cy="1163823"/>
-            </a:xfrm>
-            <a:prstGeom prst="rect">
-              <a:avLst/>
-            </a:prstGeom>
+          </a:ln>
+        </p:spPr>
+        <p:style>
+          <a:lnRef idx="2">
+            <a:schemeClr val="accent1">
+              <a:shade val="50000"/>
+            </a:schemeClr>
+          </a:lnRef>
+          <a:fillRef idx="1">
+            <a:schemeClr val="accent1"/>
+          </a:fillRef>
+          <a:effectRef idx="0">
+            <a:schemeClr val="accent1"/>
+          </a:effectRef>
+          <a:fontRef idx="minor">
+            <a:schemeClr val="lt1"/>
+          </a:fontRef>
+        </p:style>
+        <p:txBody>
+          <a:bodyPr rtlCol="0" anchor="ctr"/>
+          <a:lstStyle/>
+          <a:p>
+            <a:pPr algn="ctr"/>
+            <a:endParaRPr lang="en-US"/>
+          </a:p>
+        </p:txBody>
+      </p:sp>
+      <p:sp>
+        <p:nvSpPr>
+          <p:cNvPr id="5" name="TextBox 4">
+            <a:extLst>
+              <a:ext uri="{FF2B5EF4-FFF2-40B4-BE49-F238E27FC236}">
+                <a16:creationId xmlns:a16="http://schemas.microsoft.com/office/drawing/2014/main" id="{BFE5DAC8-7A4C-24AD-4364-95B2DA5E66DE}"/>
+              </a:ext>
+            </a:extLst>
+          </p:cNvPr>
+          <p:cNvSpPr txBox="1"/>
+          <p:nvPr/>
+        </p:nvSpPr>
+        <p:spPr>
+          <a:xfrm>
+            <a:off x="-1" y="608762"/>
+            <a:ext cx="8640761" cy="7725192"/>
+          </a:xfrm>
+          <a:prstGeom prst="rect">
+            <a:avLst/>
+          </a:prstGeom>
+          <a:noFill/>
+        </p:spPr>
+        <p:txBody>
+          <a:bodyPr wrap="square" rtlCol="0">
+            <a:spAutoFit/>
+          </a:bodyPr>
+          <a:lstStyle/>
+          <a:p>
+            <a:pPr algn="ctr"/>
+            <a:r>
+              <a:rPr lang="en-US" sz="49600" b="1" dirty="0">
+                <a:latin typeface="Roboto" panose="02000000000000000000" pitchFamily="2" charset="0"/>
+                <a:ea typeface="Roboto" panose="02000000000000000000" pitchFamily="2" charset="0"/>
+              </a:rPr>
+              <a:t>RT</a:t>
+            </a:r>
+          </a:p>
+        </p:txBody>
+      </p:sp>
+      <p:sp>
+        <p:nvSpPr>
+          <p:cNvPr id="6" name="Rectangle 5">
+            <a:extLst>
+              <a:ext uri="{FF2B5EF4-FFF2-40B4-BE49-F238E27FC236}">
+                <a16:creationId xmlns:a16="http://schemas.microsoft.com/office/drawing/2014/main" id="{3893948A-E637-9104-30B9-5D7AF71F8386}"/>
+              </a:ext>
+            </a:extLst>
+          </p:cNvPr>
+          <p:cNvSpPr/>
+          <p:nvPr/>
+        </p:nvSpPr>
+        <p:spPr>
+          <a:xfrm>
+            <a:off x="1" y="6955694"/>
+            <a:ext cx="8640760" cy="1685068"/>
+          </a:xfrm>
+          <a:prstGeom prst="rect">
+            <a:avLst/>
+          </a:prstGeom>
+          <a:solidFill>
+            <a:srgbClr val="ED3E35"/>
+          </a:solidFill>
+          <a:ln>
             <a:solidFill>
               <a:srgbClr val="ED3E35"/>
             </a:solidFill>
-            <a:ln>
-              <a:solidFill>
-                <a:srgbClr val="ED3E35"/>
-              </a:solidFill>
-            </a:ln>
-          </p:spPr>
-          <p:style>
-            <a:lnRef idx="2">
-              <a:schemeClr val="accent1">
-                <a:shade val="50000"/>
-              </a:schemeClr>
-            </a:lnRef>
-            <a:fillRef idx="1">
-              <a:schemeClr val="accent1"/>
-            </a:fillRef>
-            <a:effectRef idx="0">
-              <a:schemeClr val="accent1"/>
-            </a:effectRef>
-            <a:fontRef idx="minor">
-              <a:schemeClr val="lt1"/>
-            </a:fontRef>
-          </p:style>
-          <p:txBody>
-            <a:bodyPr rtlCol="0" anchor="ctr"/>
-            <a:lstStyle/>
-            <a:p>
-              <a:pPr algn="ctr"/>
-              <a:endParaRPr lang="en-US"/>
-            </a:p>
-          </p:txBody>
-        </p:sp>
-        <p:sp>
-          <p:nvSpPr>
-            <p:cNvPr id="7" name="Rectangle 6">
-              <a:extLst>
-                <a:ext uri="{FF2B5EF4-FFF2-40B4-BE49-F238E27FC236}">
-                  <a16:creationId xmlns:a16="http://schemas.microsoft.com/office/drawing/2014/main" id="{2B028C51-EE99-C2AA-EB51-11A6DD6EA808}"/>
-                </a:ext>
-              </a:extLst>
-            </p:cNvPr>
-            <p:cNvSpPr/>
-            <p:nvPr/>
-          </p:nvSpPr>
-          <p:spPr>
-            <a:xfrm>
-              <a:off x="914401" y="1336431"/>
-              <a:ext cx="5685691" cy="5967901"/>
-            </a:xfrm>
-            <a:prstGeom prst="rect">
-              <a:avLst/>
-            </a:prstGeom>
+          </a:ln>
+        </p:spPr>
+        <p:style>
+          <a:lnRef idx="2">
+            <a:schemeClr val="accent1">
+              <a:shade val="50000"/>
+            </a:schemeClr>
+          </a:lnRef>
+          <a:fillRef idx="1">
+            <a:schemeClr val="accent1"/>
+          </a:fillRef>
+          <a:effectRef idx="0">
+            <a:schemeClr val="accent1"/>
+          </a:effectRef>
+          <a:fontRef idx="minor">
+            <a:schemeClr val="lt1"/>
+          </a:fontRef>
+        </p:style>
+        <p:txBody>
+          <a:bodyPr rtlCol="0" anchor="ctr"/>
+          <a:lstStyle/>
+          <a:p>
+            <a:pPr algn="ctr"/>
+            <a:endParaRPr lang="en-US"/>
+          </a:p>
+        </p:txBody>
+      </p:sp>
+      <p:sp>
+        <p:nvSpPr>
+          <p:cNvPr id="7" name="Rectangle 6">
+            <a:extLst>
+              <a:ext uri="{FF2B5EF4-FFF2-40B4-BE49-F238E27FC236}">
+                <a16:creationId xmlns:a16="http://schemas.microsoft.com/office/drawing/2014/main" id="{2B028C51-EE99-C2AA-EB51-11A6DD6EA808}"/>
+              </a:ext>
+            </a:extLst>
+          </p:cNvPr>
+          <p:cNvSpPr/>
+          <p:nvPr/>
+        </p:nvSpPr>
+        <p:spPr>
+          <a:xfrm>
+            <a:off x="1" y="-1"/>
+            <a:ext cx="8640761" cy="8640763"/>
+          </a:xfrm>
+          <a:prstGeom prst="rect">
+            <a:avLst/>
+          </a:prstGeom>
+          <a:noFill/>
+          <a:ln>
             <a:noFill/>
-            <a:ln>
-              <a:noFill/>
-            </a:ln>
-          </p:spPr>
-          <p:style>
-            <a:lnRef idx="0">
-              <a:scrgbClr r="0" g="0" b="0"/>
-            </a:lnRef>
-            <a:fillRef idx="0">
-              <a:scrgbClr r="0" g="0" b="0"/>
-            </a:fillRef>
-            <a:effectRef idx="0">
-              <a:scrgbClr r="0" g="0" b="0"/>
-            </a:effectRef>
-            <a:fontRef idx="minor">
-              <a:schemeClr val="dk1"/>
-            </a:fontRef>
-          </p:style>
-          <p:txBody>
-            <a:bodyPr rtlCol="0" anchor="ctr"/>
-            <a:lstStyle/>
-            <a:p>
-              <a:pPr algn="ctr"/>
-              <a:endParaRPr lang="en-US"/>
-            </a:p>
-          </p:txBody>
-        </p:sp>
-      </p:grpSp>
+          </a:ln>
+        </p:spPr>
+        <p:style>
+          <a:lnRef idx="0">
+            <a:scrgbClr r="0" g="0" b="0"/>
+          </a:lnRef>
+          <a:fillRef idx="0">
+            <a:scrgbClr r="0" g="0" b="0"/>
+          </a:fillRef>
+          <a:effectRef idx="0">
+            <a:scrgbClr r="0" g="0" b="0"/>
+          </a:effectRef>
+          <a:fontRef idx="minor">
+            <a:schemeClr val="dk1"/>
+          </a:fontRef>
+        </p:style>
+        <p:txBody>
+          <a:bodyPr rtlCol="0" anchor="ctr"/>
+          <a:lstStyle/>
+          <a:p>
+            <a:pPr algn="ctr"/>
+            <a:endParaRPr lang="en-US"/>
+          </a:p>
+        </p:txBody>
+      </p:sp>
     </p:spTree>
     <p:extLst>
       <p:ext uri="{BB962C8B-B14F-4D97-AF65-F5344CB8AC3E}">

</xml_diff>

<commit_message>
Fix relative links and favicon (#4)
- Change relative links, now they all start from `/riocontra-translator/` (compatible with github pages)
- Improve favicon
- Change link to favicon using the absolute URL
</commit_message>
<xml_diff>
--- a/img/RT_logos.pptx
+++ b/img/RT_logos.pptx
@@ -5119,222 +5119,201 @@
           <a:chExt cx="0" cy="0"/>
         </a:xfrm>
       </p:grpSpPr>
-      <p:grpSp>
-        <p:nvGrpSpPr>
-          <p:cNvPr id="8" name="Group 7">
-            <a:extLst>
-              <a:ext uri="{FF2B5EF4-FFF2-40B4-BE49-F238E27FC236}">
-                <a16:creationId xmlns:a16="http://schemas.microsoft.com/office/drawing/2014/main" id="{6B9C3359-2D78-5EED-C930-6D511C543D54}"/>
-              </a:ext>
-            </a:extLst>
-          </p:cNvPr>
-          <p:cNvGrpSpPr/>
+      <p:sp>
+        <p:nvSpPr>
+          <p:cNvPr id="4" name="Rectangle 3">
+            <a:extLst>
+              <a:ext uri="{FF2B5EF4-FFF2-40B4-BE49-F238E27FC236}">
+                <a16:creationId xmlns:a16="http://schemas.microsoft.com/office/drawing/2014/main" id="{01F57C9C-A43B-F8A1-9281-FE97FF956B6C}"/>
+              </a:ext>
+            </a:extLst>
+          </p:cNvPr>
+          <p:cNvSpPr/>
           <p:nvPr/>
-        </p:nvGrpSpPr>
-        <p:grpSpPr>
+        </p:nvSpPr>
+        <p:spPr>
           <a:xfrm>
-            <a:off x="1477535" y="1336430"/>
-            <a:ext cx="5685692" cy="5967901"/>
-            <a:chOff x="914400" y="1336431"/>
-            <a:chExt cx="5685692" cy="5967901"/>
+            <a:off x="1" y="-1"/>
+            <a:ext cx="8640760" cy="1685068"/>
           </a:xfrm>
-        </p:grpSpPr>
-        <p:sp>
-          <p:nvSpPr>
-            <p:cNvPr id="4" name="Rectangle 3">
-              <a:extLst>
-                <a:ext uri="{FF2B5EF4-FFF2-40B4-BE49-F238E27FC236}">
-                  <a16:creationId xmlns:a16="http://schemas.microsoft.com/office/drawing/2014/main" id="{01F57C9C-A43B-F8A1-9281-FE97FF956B6C}"/>
-                </a:ext>
-              </a:extLst>
-            </p:cNvPr>
-            <p:cNvSpPr/>
-            <p:nvPr/>
-          </p:nvSpPr>
-          <p:spPr>
-            <a:xfrm>
-              <a:off x="914401" y="1336431"/>
-              <a:ext cx="5685690" cy="1163823"/>
-            </a:xfrm>
-            <a:prstGeom prst="rect">
-              <a:avLst/>
-            </a:prstGeom>
+          <a:prstGeom prst="rect">
+            <a:avLst/>
+          </a:prstGeom>
+          <a:solidFill>
+            <a:srgbClr val="F48325"/>
+          </a:solidFill>
+          <a:ln>
             <a:solidFill>
               <a:srgbClr val="F48325"/>
             </a:solidFill>
-            <a:ln>
-              <a:solidFill>
-                <a:srgbClr val="F48325"/>
-              </a:solidFill>
-            </a:ln>
-          </p:spPr>
-          <p:style>
-            <a:lnRef idx="2">
-              <a:schemeClr val="accent1">
-                <a:shade val="50000"/>
-              </a:schemeClr>
-            </a:lnRef>
-            <a:fillRef idx="1">
-              <a:schemeClr val="accent1"/>
-            </a:fillRef>
-            <a:effectRef idx="0">
-              <a:schemeClr val="accent1"/>
-            </a:effectRef>
-            <a:fontRef idx="minor">
-              <a:schemeClr val="lt1"/>
-            </a:fontRef>
-          </p:style>
-          <p:txBody>
-            <a:bodyPr rtlCol="0" anchor="ctr"/>
-            <a:lstStyle/>
-            <a:p>
-              <a:pPr algn="ctr"/>
-              <a:endParaRPr lang="en-US"/>
-            </a:p>
-          </p:txBody>
-        </p:sp>
-        <p:sp>
-          <p:nvSpPr>
-            <p:cNvPr id="5" name="TextBox 4">
-              <a:extLst>
-                <a:ext uri="{FF2B5EF4-FFF2-40B4-BE49-F238E27FC236}">
-                  <a16:creationId xmlns:a16="http://schemas.microsoft.com/office/drawing/2014/main" id="{BFE5DAC8-7A4C-24AD-4364-95B2DA5E66DE}"/>
-                </a:ext>
-              </a:extLst>
-            </p:cNvPr>
-            <p:cNvSpPr txBox="1"/>
-            <p:nvPr/>
-          </p:nvSpPr>
-          <p:spPr>
-            <a:xfrm>
-              <a:off x="914400" y="1627336"/>
-              <a:ext cx="5685691" cy="5386090"/>
-            </a:xfrm>
-            <a:prstGeom prst="rect">
-              <a:avLst/>
-            </a:prstGeom>
-            <a:noFill/>
-          </p:spPr>
-          <p:txBody>
-            <a:bodyPr wrap="square" rtlCol="0">
-              <a:spAutoFit/>
-            </a:bodyPr>
-            <a:lstStyle/>
-            <a:p>
-              <a:pPr algn="ctr"/>
-              <a:r>
-                <a:rPr lang="en-US" sz="34400" b="1" dirty="0">
-                  <a:latin typeface="Roboto" panose="02000000000000000000" pitchFamily="2" charset="0"/>
-                  <a:ea typeface="Roboto" panose="02000000000000000000" pitchFamily="2" charset="0"/>
-                </a:rPr>
-                <a:t>RT</a:t>
-              </a:r>
-            </a:p>
-          </p:txBody>
-        </p:sp>
-        <p:sp>
-          <p:nvSpPr>
-            <p:cNvPr id="6" name="Rectangle 5">
-              <a:extLst>
-                <a:ext uri="{FF2B5EF4-FFF2-40B4-BE49-F238E27FC236}">
-                  <a16:creationId xmlns:a16="http://schemas.microsoft.com/office/drawing/2014/main" id="{3893948A-E637-9104-30B9-5D7AF71F8386}"/>
-                </a:ext>
-              </a:extLst>
-            </p:cNvPr>
-            <p:cNvSpPr/>
-            <p:nvPr/>
-          </p:nvSpPr>
-          <p:spPr>
-            <a:xfrm>
-              <a:off x="914401" y="6140509"/>
-              <a:ext cx="5685690" cy="1163823"/>
-            </a:xfrm>
-            <a:prstGeom prst="rect">
-              <a:avLst/>
-            </a:prstGeom>
+          </a:ln>
+        </p:spPr>
+        <p:style>
+          <a:lnRef idx="2">
+            <a:schemeClr val="accent1">
+              <a:shade val="50000"/>
+            </a:schemeClr>
+          </a:lnRef>
+          <a:fillRef idx="1">
+            <a:schemeClr val="accent1"/>
+          </a:fillRef>
+          <a:effectRef idx="0">
+            <a:schemeClr val="accent1"/>
+          </a:effectRef>
+          <a:fontRef idx="minor">
+            <a:schemeClr val="lt1"/>
+          </a:fontRef>
+        </p:style>
+        <p:txBody>
+          <a:bodyPr rtlCol="0" anchor="ctr"/>
+          <a:lstStyle/>
+          <a:p>
+            <a:pPr algn="ctr"/>
+            <a:endParaRPr lang="en-US"/>
+          </a:p>
+        </p:txBody>
+      </p:sp>
+      <p:sp>
+        <p:nvSpPr>
+          <p:cNvPr id="5" name="TextBox 4">
+            <a:extLst>
+              <a:ext uri="{FF2B5EF4-FFF2-40B4-BE49-F238E27FC236}">
+                <a16:creationId xmlns:a16="http://schemas.microsoft.com/office/drawing/2014/main" id="{BFE5DAC8-7A4C-24AD-4364-95B2DA5E66DE}"/>
+              </a:ext>
+            </a:extLst>
+          </p:cNvPr>
+          <p:cNvSpPr txBox="1"/>
+          <p:nvPr/>
+        </p:nvSpPr>
+        <p:spPr>
+          <a:xfrm>
+            <a:off x="-1" y="608762"/>
+            <a:ext cx="8640761" cy="7725192"/>
+          </a:xfrm>
+          <a:prstGeom prst="rect">
+            <a:avLst/>
+          </a:prstGeom>
+          <a:noFill/>
+        </p:spPr>
+        <p:txBody>
+          <a:bodyPr wrap="square" rtlCol="0">
+            <a:spAutoFit/>
+          </a:bodyPr>
+          <a:lstStyle/>
+          <a:p>
+            <a:pPr algn="ctr"/>
+            <a:r>
+              <a:rPr lang="en-US" sz="49600" b="1" dirty="0">
+                <a:latin typeface="Roboto" panose="02000000000000000000" pitchFamily="2" charset="0"/>
+                <a:ea typeface="Roboto" panose="02000000000000000000" pitchFamily="2" charset="0"/>
+              </a:rPr>
+              <a:t>RT</a:t>
+            </a:r>
+          </a:p>
+        </p:txBody>
+      </p:sp>
+      <p:sp>
+        <p:nvSpPr>
+          <p:cNvPr id="6" name="Rectangle 5">
+            <a:extLst>
+              <a:ext uri="{FF2B5EF4-FFF2-40B4-BE49-F238E27FC236}">
+                <a16:creationId xmlns:a16="http://schemas.microsoft.com/office/drawing/2014/main" id="{3893948A-E637-9104-30B9-5D7AF71F8386}"/>
+              </a:ext>
+            </a:extLst>
+          </p:cNvPr>
+          <p:cNvSpPr/>
+          <p:nvPr/>
+        </p:nvSpPr>
+        <p:spPr>
+          <a:xfrm>
+            <a:off x="1" y="6955694"/>
+            <a:ext cx="8640760" cy="1685068"/>
+          </a:xfrm>
+          <a:prstGeom prst="rect">
+            <a:avLst/>
+          </a:prstGeom>
+          <a:solidFill>
+            <a:srgbClr val="ED3E35"/>
+          </a:solidFill>
+          <a:ln>
             <a:solidFill>
               <a:srgbClr val="ED3E35"/>
             </a:solidFill>
-            <a:ln>
-              <a:solidFill>
-                <a:srgbClr val="ED3E35"/>
-              </a:solidFill>
-            </a:ln>
-          </p:spPr>
-          <p:style>
-            <a:lnRef idx="2">
-              <a:schemeClr val="accent1">
-                <a:shade val="50000"/>
-              </a:schemeClr>
-            </a:lnRef>
-            <a:fillRef idx="1">
-              <a:schemeClr val="accent1"/>
-            </a:fillRef>
-            <a:effectRef idx="0">
-              <a:schemeClr val="accent1"/>
-            </a:effectRef>
-            <a:fontRef idx="minor">
-              <a:schemeClr val="lt1"/>
-            </a:fontRef>
-          </p:style>
-          <p:txBody>
-            <a:bodyPr rtlCol="0" anchor="ctr"/>
-            <a:lstStyle/>
-            <a:p>
-              <a:pPr algn="ctr"/>
-              <a:endParaRPr lang="en-US"/>
-            </a:p>
-          </p:txBody>
-        </p:sp>
-        <p:sp>
-          <p:nvSpPr>
-            <p:cNvPr id="7" name="Rectangle 6">
-              <a:extLst>
-                <a:ext uri="{FF2B5EF4-FFF2-40B4-BE49-F238E27FC236}">
-                  <a16:creationId xmlns:a16="http://schemas.microsoft.com/office/drawing/2014/main" id="{2B028C51-EE99-C2AA-EB51-11A6DD6EA808}"/>
-                </a:ext>
-              </a:extLst>
-            </p:cNvPr>
-            <p:cNvSpPr/>
-            <p:nvPr/>
-          </p:nvSpPr>
-          <p:spPr>
-            <a:xfrm>
-              <a:off x="914401" y="1336431"/>
-              <a:ext cx="5685691" cy="5967901"/>
-            </a:xfrm>
-            <a:prstGeom prst="rect">
-              <a:avLst/>
-            </a:prstGeom>
+          </a:ln>
+        </p:spPr>
+        <p:style>
+          <a:lnRef idx="2">
+            <a:schemeClr val="accent1">
+              <a:shade val="50000"/>
+            </a:schemeClr>
+          </a:lnRef>
+          <a:fillRef idx="1">
+            <a:schemeClr val="accent1"/>
+          </a:fillRef>
+          <a:effectRef idx="0">
+            <a:schemeClr val="accent1"/>
+          </a:effectRef>
+          <a:fontRef idx="minor">
+            <a:schemeClr val="lt1"/>
+          </a:fontRef>
+        </p:style>
+        <p:txBody>
+          <a:bodyPr rtlCol="0" anchor="ctr"/>
+          <a:lstStyle/>
+          <a:p>
+            <a:pPr algn="ctr"/>
+            <a:endParaRPr lang="en-US"/>
+          </a:p>
+        </p:txBody>
+      </p:sp>
+      <p:sp>
+        <p:nvSpPr>
+          <p:cNvPr id="7" name="Rectangle 6">
+            <a:extLst>
+              <a:ext uri="{FF2B5EF4-FFF2-40B4-BE49-F238E27FC236}">
+                <a16:creationId xmlns:a16="http://schemas.microsoft.com/office/drawing/2014/main" id="{2B028C51-EE99-C2AA-EB51-11A6DD6EA808}"/>
+              </a:ext>
+            </a:extLst>
+          </p:cNvPr>
+          <p:cNvSpPr/>
+          <p:nvPr/>
+        </p:nvSpPr>
+        <p:spPr>
+          <a:xfrm>
+            <a:off x="1" y="-1"/>
+            <a:ext cx="8640761" cy="8640763"/>
+          </a:xfrm>
+          <a:prstGeom prst="rect">
+            <a:avLst/>
+          </a:prstGeom>
+          <a:noFill/>
+          <a:ln>
             <a:noFill/>
-            <a:ln>
-              <a:noFill/>
-            </a:ln>
-          </p:spPr>
-          <p:style>
-            <a:lnRef idx="0">
-              <a:scrgbClr r="0" g="0" b="0"/>
-            </a:lnRef>
-            <a:fillRef idx="0">
-              <a:scrgbClr r="0" g="0" b="0"/>
-            </a:fillRef>
-            <a:effectRef idx="0">
-              <a:scrgbClr r="0" g="0" b="0"/>
-            </a:effectRef>
-            <a:fontRef idx="minor">
-              <a:schemeClr val="dk1"/>
-            </a:fontRef>
-          </p:style>
-          <p:txBody>
-            <a:bodyPr rtlCol="0" anchor="ctr"/>
-            <a:lstStyle/>
-            <a:p>
-              <a:pPr algn="ctr"/>
-              <a:endParaRPr lang="en-US"/>
-            </a:p>
-          </p:txBody>
-        </p:sp>
-      </p:grpSp>
+          </a:ln>
+        </p:spPr>
+        <p:style>
+          <a:lnRef idx="0">
+            <a:scrgbClr r="0" g="0" b="0"/>
+          </a:lnRef>
+          <a:fillRef idx="0">
+            <a:scrgbClr r="0" g="0" b="0"/>
+          </a:fillRef>
+          <a:effectRef idx="0">
+            <a:scrgbClr r="0" g="0" b="0"/>
+          </a:effectRef>
+          <a:fontRef idx="minor">
+            <a:schemeClr val="dk1"/>
+          </a:fontRef>
+        </p:style>
+        <p:txBody>
+          <a:bodyPr rtlCol="0" anchor="ctr"/>
+          <a:lstStyle/>
+          <a:p>
+            <a:pPr algn="ctr"/>
+            <a:endParaRPr lang="en-US"/>
+          </a:p>
+        </p:txBody>
+      </p:sp>
     </p:spTree>
     <p:extLst>
       <p:ext uri="{BB962C8B-B14F-4D97-AF65-F5344CB8AC3E}">

</xml_diff>